<commit_message>
Deploying to gh-pages from @ Minee-Liane-Choi/MineeChoiLab@d9c724506371eea6966395ec3b65cb5b005d0470 🚀
</commit_message>
<xml_diff>
--- a/images/BRePair.pptx
+++ b/images/BRePair.pptx
@@ -259,7 +259,7 @@
           <a:p>
             <a:fld id="{F7E3ADD5-DB0C-4D4E-A7B7-2A6E4D425DCC}" type="datetimeFigureOut">
               <a:rPr lang="en-US" smtClean="0"/>
-              <a:t>4/9/2023</a:t>
+              <a:t>6/16/2023</a:t>
             </a:fld>
             <a:endParaRPr lang="en-US"/>
           </a:p>
@@ -457,7 +457,7 @@
           <a:p>
             <a:fld id="{F7E3ADD5-DB0C-4D4E-A7B7-2A6E4D425DCC}" type="datetimeFigureOut">
               <a:rPr lang="en-US" smtClean="0"/>
-              <a:t>4/9/2023</a:t>
+              <a:t>6/16/2023</a:t>
             </a:fld>
             <a:endParaRPr lang="en-US"/>
           </a:p>
@@ -665,7 +665,7 @@
           <a:p>
             <a:fld id="{F7E3ADD5-DB0C-4D4E-A7B7-2A6E4D425DCC}" type="datetimeFigureOut">
               <a:rPr lang="en-US" smtClean="0"/>
-              <a:t>4/9/2023</a:t>
+              <a:t>6/16/2023</a:t>
             </a:fld>
             <a:endParaRPr lang="en-US"/>
           </a:p>
@@ -863,7 +863,7 @@
           <a:p>
             <a:fld id="{F7E3ADD5-DB0C-4D4E-A7B7-2A6E4D425DCC}" type="datetimeFigureOut">
               <a:rPr lang="en-US" smtClean="0"/>
-              <a:t>4/9/2023</a:t>
+              <a:t>6/16/2023</a:t>
             </a:fld>
             <a:endParaRPr lang="en-US"/>
           </a:p>
@@ -1138,7 +1138,7 @@
           <a:p>
             <a:fld id="{F7E3ADD5-DB0C-4D4E-A7B7-2A6E4D425DCC}" type="datetimeFigureOut">
               <a:rPr lang="en-US" smtClean="0"/>
-              <a:t>4/9/2023</a:t>
+              <a:t>6/16/2023</a:t>
             </a:fld>
             <a:endParaRPr lang="en-US"/>
           </a:p>
@@ -1403,7 +1403,7 @@
           <a:p>
             <a:fld id="{F7E3ADD5-DB0C-4D4E-A7B7-2A6E4D425DCC}" type="datetimeFigureOut">
               <a:rPr lang="en-US" smtClean="0"/>
-              <a:t>4/9/2023</a:t>
+              <a:t>6/16/2023</a:t>
             </a:fld>
             <a:endParaRPr lang="en-US"/>
           </a:p>
@@ -1815,7 +1815,7 @@
           <a:p>
             <a:fld id="{F7E3ADD5-DB0C-4D4E-A7B7-2A6E4D425DCC}" type="datetimeFigureOut">
               <a:rPr lang="en-US" smtClean="0"/>
-              <a:t>4/9/2023</a:t>
+              <a:t>6/16/2023</a:t>
             </a:fld>
             <a:endParaRPr lang="en-US"/>
           </a:p>
@@ -1956,7 +1956,7 @@
           <a:p>
             <a:fld id="{F7E3ADD5-DB0C-4D4E-A7B7-2A6E4D425DCC}" type="datetimeFigureOut">
               <a:rPr lang="en-US" smtClean="0"/>
-              <a:t>4/9/2023</a:t>
+              <a:t>6/16/2023</a:t>
             </a:fld>
             <a:endParaRPr lang="en-US"/>
           </a:p>
@@ -2069,7 +2069,7 @@
           <a:p>
             <a:fld id="{F7E3ADD5-DB0C-4D4E-A7B7-2A6E4D425DCC}" type="datetimeFigureOut">
               <a:rPr lang="en-US" smtClean="0"/>
-              <a:t>4/9/2023</a:t>
+              <a:t>6/16/2023</a:t>
             </a:fld>
             <a:endParaRPr lang="en-US"/>
           </a:p>
@@ -2380,7 +2380,7 @@
           <a:p>
             <a:fld id="{F7E3ADD5-DB0C-4D4E-A7B7-2A6E4D425DCC}" type="datetimeFigureOut">
               <a:rPr lang="en-US" smtClean="0"/>
-              <a:t>4/9/2023</a:t>
+              <a:t>6/16/2023</a:t>
             </a:fld>
             <a:endParaRPr lang="en-US"/>
           </a:p>
@@ -2668,7 +2668,7 @@
           <a:p>
             <a:fld id="{F7E3ADD5-DB0C-4D4E-A7B7-2A6E4D425DCC}" type="datetimeFigureOut">
               <a:rPr lang="en-US" smtClean="0"/>
-              <a:t>4/9/2023</a:t>
+              <a:t>6/16/2023</a:t>
             </a:fld>
             <a:endParaRPr lang="en-US"/>
           </a:p>
@@ -2909,7 +2909,7 @@
           <a:p>
             <a:fld id="{F7E3ADD5-DB0C-4D4E-A7B7-2A6E4D425DCC}" type="datetimeFigureOut">
               <a:rPr lang="en-US" smtClean="0"/>
-              <a:t>4/9/2023</a:t>
+              <a:t>6/16/2023</a:t>
             </a:fld>
             <a:endParaRPr lang="en-US"/>
           </a:p>
@@ -3326,48 +3326,12 @@
           <a:chExt cx="0" cy="0"/>
         </a:xfrm>
       </p:grpSpPr>
-      <p:pic>
-        <p:nvPicPr>
-          <p:cNvPr id="1264" name="Picture 1263" descr="Shape&#10;&#10;Description automatically generated with low confidence">
-            <a:extLst>
-              <a:ext uri="{FF2B5EF4-FFF2-40B4-BE49-F238E27FC236}">
-                <a16:creationId xmlns:a16="http://schemas.microsoft.com/office/drawing/2014/main" id="{C80C28DE-3A0D-5F6A-B691-D2B9CE4B83F0}"/>
-              </a:ext>
-            </a:extLst>
-          </p:cNvPr>
-          <p:cNvPicPr>
-            <a:picLocks noChangeAspect="1"/>
-          </p:cNvPicPr>
-          <p:nvPr/>
-        </p:nvPicPr>
-        <p:blipFill>
-          <a:blip r:embed="rId2">
-            <a:extLst>
-              <a:ext uri="{28A0092B-C50C-407E-A947-70E740481C1C}">
-                <a14:useLocalDpi xmlns:a14="http://schemas.microsoft.com/office/drawing/2010/main" val="0"/>
-              </a:ext>
-            </a:extLst>
-          </a:blip>
-          <a:stretch>
-            <a:fillRect/>
-          </a:stretch>
-        </p:blipFill>
-        <p:spPr>
-          <a:xfrm>
-            <a:off x="586591" y="126651"/>
-            <a:ext cx="160145" cy="160145"/>
-          </a:xfrm>
-          <a:prstGeom prst="rect">
-            <a:avLst/>
-          </a:prstGeom>
-        </p:spPr>
-      </p:pic>
       <p:grpSp>
         <p:nvGrpSpPr>
-          <p:cNvPr id="1373" name="Group 1372">
-            <a:extLst>
-              <a:ext uri="{FF2B5EF4-FFF2-40B4-BE49-F238E27FC236}">
-                <a16:creationId xmlns:a16="http://schemas.microsoft.com/office/drawing/2014/main" id="{4AA43B7E-23A5-1C89-C704-76E345F71DB1}"/>
+          <p:cNvPr id="8" name="Group 7">
+            <a:extLst>
+              <a:ext uri="{FF2B5EF4-FFF2-40B4-BE49-F238E27FC236}">
+                <a16:creationId xmlns:a16="http://schemas.microsoft.com/office/drawing/2014/main" id="{CA49AB85-EFEB-4724-B98B-09387E6B5CE2}"/>
               </a:ext>
             </a:extLst>
           </p:cNvPr>
@@ -3376,384 +3340,468 @@
         </p:nvGrpSpPr>
         <p:grpSpPr>
           <a:xfrm>
-            <a:off x="287179" y="85521"/>
-            <a:ext cx="230850" cy="228382"/>
-            <a:chOff x="290989" y="329361"/>
-            <a:chExt cx="230850" cy="228382"/>
+            <a:off x="800835" y="598351"/>
+            <a:ext cx="952560" cy="910756"/>
+            <a:chOff x="2923005" y="2949121"/>
+            <a:chExt cx="952560" cy="910756"/>
           </a:xfrm>
         </p:grpSpPr>
-        <p:sp>
-          <p:nvSpPr>
-            <p:cNvPr id="1355" name="Rectangle: Rounded Corners 1354">
+        <p:grpSp>
+          <p:nvGrpSpPr>
+            <p:cNvPr id="3" name="Group 2">
               <a:extLst>
                 <a:ext uri="{FF2B5EF4-FFF2-40B4-BE49-F238E27FC236}">
-                  <a16:creationId xmlns:a16="http://schemas.microsoft.com/office/drawing/2014/main" id="{DE3585EB-417B-A528-6FF4-CED9C4D8EAAB}"/>
+                  <a16:creationId xmlns:a16="http://schemas.microsoft.com/office/drawing/2014/main" id="{2DC1A990-E3BC-47E7-BB8D-239067C13AE4}"/>
                 </a:ext>
               </a:extLst>
             </p:cNvPr>
-            <p:cNvSpPr>
-              <a:spLocks noChangeAspect="1"/>
-            </p:cNvSpPr>
+            <p:cNvGrpSpPr/>
             <p:nvPr/>
-          </p:nvSpPr>
-          <p:spPr>
+          </p:nvGrpSpPr>
+          <p:grpSpPr>
             <a:xfrm>
-              <a:off x="290989" y="329361"/>
-              <a:ext cx="108813" cy="108813"/>
+              <a:off x="2923005" y="3001902"/>
+              <a:ext cx="411423" cy="411423"/>
+              <a:chOff x="2923005" y="3001902"/>
+              <a:chExt cx="411423" cy="411423"/>
             </a:xfrm>
-            <a:prstGeom prst="roundRect">
-              <a:avLst>
-                <a:gd name="adj" fmla="val 11026"/>
-              </a:avLst>
-            </a:prstGeom>
-            <a:solidFill>
-              <a:srgbClr val="FF6600"/>
-            </a:solidFill>
-            <a:ln>
+          </p:grpSpPr>
+          <p:sp>
+            <p:nvSpPr>
+              <p:cNvPr id="13" name="Rectangle: Rounded Corners 12">
+                <a:extLst>
+                  <a:ext uri="{FF2B5EF4-FFF2-40B4-BE49-F238E27FC236}">
+                    <a16:creationId xmlns:a16="http://schemas.microsoft.com/office/drawing/2014/main" id="{FE014D9C-C0EE-4500-A18D-2907C88A6D4B}"/>
+                  </a:ext>
+                </a:extLst>
+              </p:cNvPr>
+              <p:cNvSpPr>
+                <a:spLocks noChangeAspect="1"/>
+              </p:cNvSpPr>
+              <p:nvPr/>
+            </p:nvSpPr>
+            <p:spPr>
+              <a:xfrm>
+                <a:off x="2923005" y="3001902"/>
+                <a:ext cx="411423" cy="411423"/>
+              </a:xfrm>
+              <a:prstGeom prst="roundRect">
+                <a:avLst>
+                  <a:gd name="adj" fmla="val 11026"/>
+                </a:avLst>
+              </a:prstGeom>
+              <a:solidFill>
+                <a:srgbClr val="FF6600"/>
+              </a:solidFill>
+              <a:ln>
+                <a:noFill/>
+              </a:ln>
+            </p:spPr>
+            <p:style>
+              <a:lnRef idx="2">
+                <a:schemeClr val="accent1">
+                  <a:shade val="50000"/>
+                </a:schemeClr>
+              </a:lnRef>
+              <a:fillRef idx="1">
+                <a:schemeClr val="accent1"/>
+              </a:fillRef>
+              <a:effectRef idx="0">
+                <a:schemeClr val="accent1"/>
+              </a:effectRef>
+              <a:fontRef idx="minor">
+                <a:schemeClr val="lt1"/>
+              </a:fontRef>
+            </p:style>
+            <p:txBody>
+              <a:bodyPr rtlCol="0" anchor="ctr"/>
+              <a:lstStyle/>
+              <a:p>
+                <a:pPr algn="ctr"/>
+                <a:endParaRPr lang="en-US"/>
+              </a:p>
+            </p:txBody>
+          </p:sp>
+          <p:pic>
+            <p:nvPicPr>
+              <p:cNvPr id="14" name="Picture 13" descr="A picture containing night sky&#10;&#10;Description automatically generated">
+                <a:extLst>
+                  <a:ext uri="{FF2B5EF4-FFF2-40B4-BE49-F238E27FC236}">
+                    <a16:creationId xmlns:a16="http://schemas.microsoft.com/office/drawing/2014/main" id="{2A3B0C72-863A-4ED1-B70A-EDD430A27264}"/>
+                  </a:ext>
+                </a:extLst>
+              </p:cNvPr>
+              <p:cNvPicPr>
+                <a:picLocks noChangeAspect="1"/>
+              </p:cNvPicPr>
+              <p:nvPr/>
+            </p:nvPicPr>
+            <p:blipFill>
+              <a:blip r:embed="rId2">
+                <a:extLst>
+                  <a:ext uri="{28A0092B-C50C-407E-A947-70E740481C1C}">
+                    <a14:useLocalDpi xmlns:a14="http://schemas.microsoft.com/office/drawing/2010/main" val="0"/>
+                  </a:ext>
+                </a:extLst>
+              </a:blip>
+              <a:stretch>
+                <a:fillRect/>
+              </a:stretch>
+            </p:blipFill>
+            <p:spPr>
+              <a:xfrm>
+                <a:off x="2945226" y="3029670"/>
+                <a:ext cx="355374" cy="369220"/>
+              </a:xfrm>
+              <a:prstGeom prst="rect">
+                <a:avLst/>
+              </a:prstGeom>
               <a:noFill/>
-            </a:ln>
-          </p:spPr>
-          <p:style>
-            <a:lnRef idx="2">
-              <a:schemeClr val="accent1">
-                <a:shade val="50000"/>
-              </a:schemeClr>
-            </a:lnRef>
-            <a:fillRef idx="1">
-              <a:schemeClr val="accent1"/>
-            </a:fillRef>
-            <a:effectRef idx="0">
-              <a:schemeClr val="accent1"/>
-            </a:effectRef>
-            <a:fontRef idx="minor">
-              <a:schemeClr val="lt1"/>
-            </a:fontRef>
-          </p:style>
-          <p:txBody>
-            <a:bodyPr rtlCol="0" anchor="ctr"/>
-            <a:lstStyle/>
-            <a:p>
-              <a:pPr algn="ctr"/>
-              <a:endParaRPr lang="en-US"/>
-            </a:p>
-          </p:txBody>
-        </p:sp>
-        <p:pic>
-          <p:nvPicPr>
-            <p:cNvPr id="1334" name="Picture 1333" descr="A picture containing night sky&#10;&#10;Description automatically generated">
+              <a:ln>
+                <a:noFill/>
+              </a:ln>
+            </p:spPr>
+          </p:pic>
+        </p:grpSp>
+        <p:grpSp>
+          <p:nvGrpSpPr>
+            <p:cNvPr id="4" name="Group 3">
               <a:extLst>
                 <a:ext uri="{FF2B5EF4-FFF2-40B4-BE49-F238E27FC236}">
-                  <a16:creationId xmlns:a16="http://schemas.microsoft.com/office/drawing/2014/main" id="{48A552D5-E3A8-3198-FF74-73664550F57A}"/>
+                  <a16:creationId xmlns:a16="http://schemas.microsoft.com/office/drawing/2014/main" id="{E6F2E65D-D9F8-4939-94B8-8DC52D5FD807}"/>
                 </a:ext>
               </a:extLst>
             </p:cNvPr>
-            <p:cNvPicPr>
-              <a:picLocks noChangeAspect="1"/>
-            </p:cNvPicPr>
+            <p:cNvGrpSpPr/>
             <p:nvPr/>
-          </p:nvPicPr>
-          <p:blipFill>
-            <a:blip r:embed="rId3">
-              <a:extLst>
-                <a:ext uri="{28A0092B-C50C-407E-A947-70E740481C1C}">
-                  <a14:useLocalDpi xmlns:a14="http://schemas.microsoft.com/office/drawing/2010/main" val="0"/>
-                </a:ext>
-              </a:extLst>
-            </a:blip>
-            <a:stretch>
-              <a:fillRect/>
-            </a:stretch>
-          </p:blipFill>
-          <p:spPr>
+          </p:nvGrpSpPr>
+          <p:grpSpPr>
             <a:xfrm>
-              <a:off x="296866" y="336705"/>
-              <a:ext cx="93989" cy="97651"/>
+              <a:off x="2923005" y="3448454"/>
+              <a:ext cx="411423" cy="411423"/>
+              <a:chOff x="2923005" y="3453994"/>
+              <a:chExt cx="411423" cy="411423"/>
             </a:xfrm>
-            <a:prstGeom prst="rect">
-              <a:avLst/>
-            </a:prstGeom>
-            <a:noFill/>
-            <a:ln>
-              <a:noFill/>
-            </a:ln>
-          </p:spPr>
-        </p:pic>
-        <p:sp>
-          <p:nvSpPr>
-            <p:cNvPr id="1356" name="Rectangle: Rounded Corners 1355">
+          </p:grpSpPr>
+          <p:sp>
+            <p:nvSpPr>
+              <p:cNvPr id="16" name="Rectangle: Rounded Corners 15">
+                <a:extLst>
+                  <a:ext uri="{FF2B5EF4-FFF2-40B4-BE49-F238E27FC236}">
+                    <a16:creationId xmlns:a16="http://schemas.microsoft.com/office/drawing/2014/main" id="{6B091E36-A1AA-4910-AF0C-6AC0089D6564}"/>
+                  </a:ext>
+                </a:extLst>
+              </p:cNvPr>
+              <p:cNvSpPr>
+                <a:spLocks noChangeAspect="1"/>
+              </p:cNvSpPr>
+              <p:nvPr/>
+            </p:nvSpPr>
+            <p:spPr>
+              <a:xfrm>
+                <a:off x="2923005" y="3453994"/>
+                <a:ext cx="411423" cy="411423"/>
+              </a:xfrm>
+              <a:prstGeom prst="roundRect">
+                <a:avLst>
+                  <a:gd name="adj" fmla="val 11026"/>
+                </a:avLst>
+              </a:prstGeom>
+              <a:solidFill>
+                <a:srgbClr val="00B0F0"/>
+              </a:solidFill>
+              <a:ln>
+                <a:noFill/>
+              </a:ln>
+            </p:spPr>
+            <p:style>
+              <a:lnRef idx="2">
+                <a:schemeClr val="accent1">
+                  <a:shade val="50000"/>
+                </a:schemeClr>
+              </a:lnRef>
+              <a:fillRef idx="1">
+                <a:schemeClr val="accent1"/>
+              </a:fillRef>
+              <a:effectRef idx="0">
+                <a:schemeClr val="accent1"/>
+              </a:effectRef>
+              <a:fontRef idx="minor">
+                <a:schemeClr val="lt1"/>
+              </a:fontRef>
+            </p:style>
+            <p:txBody>
+              <a:bodyPr rtlCol="0" anchor="ctr"/>
+              <a:lstStyle/>
+              <a:p>
+                <a:pPr algn="ctr"/>
+                <a:endParaRPr lang="en-US"/>
+              </a:p>
+            </p:txBody>
+          </p:sp>
+          <p:pic>
+            <p:nvPicPr>
+              <p:cNvPr id="18" name="Picture 17" descr="A black rectangle with a black background&#10;&#10;Description automatically generated with low confidence">
+                <a:extLst>
+                  <a:ext uri="{FF2B5EF4-FFF2-40B4-BE49-F238E27FC236}">
+                    <a16:creationId xmlns:a16="http://schemas.microsoft.com/office/drawing/2014/main" id="{C9F906B9-EB39-4D5D-8459-341927611163}"/>
+                  </a:ext>
+                </a:extLst>
+              </p:cNvPr>
+              <p:cNvPicPr>
+                <a:picLocks noChangeAspect="1"/>
+              </p:cNvPicPr>
+              <p:nvPr/>
+            </p:nvPicPr>
+            <p:blipFill>
+              <a:blip r:embed="rId3">
+                <a:extLst>
+                  <a:ext uri="{28A0092B-C50C-407E-A947-70E740481C1C}">
+                    <a14:useLocalDpi xmlns:a14="http://schemas.microsoft.com/office/drawing/2010/main" val="0"/>
+                  </a:ext>
+                </a:extLst>
+              </a:blip>
+              <a:stretch>
+                <a:fillRect/>
+              </a:stretch>
+            </p:blipFill>
+            <p:spPr>
+              <a:xfrm>
+                <a:off x="2941952" y="3467031"/>
+                <a:ext cx="377595" cy="378343"/>
+              </a:xfrm>
+              <a:prstGeom prst="rect">
+                <a:avLst/>
+              </a:prstGeom>
+            </p:spPr>
+          </p:pic>
+        </p:grpSp>
+        <p:grpSp>
+          <p:nvGrpSpPr>
+            <p:cNvPr id="5" name="Group 4">
               <a:extLst>
                 <a:ext uri="{FF2B5EF4-FFF2-40B4-BE49-F238E27FC236}">
-                  <a16:creationId xmlns:a16="http://schemas.microsoft.com/office/drawing/2014/main" id="{96EC997D-2606-8EDC-91B2-DD3DAEB839F2}"/>
+                  <a16:creationId xmlns:a16="http://schemas.microsoft.com/office/drawing/2014/main" id="{69A3A054-55C3-4843-B706-A941FC881986}"/>
                 </a:ext>
               </a:extLst>
             </p:cNvPr>
-            <p:cNvSpPr>
-              <a:spLocks noChangeAspect="1"/>
-            </p:cNvSpPr>
+            <p:cNvGrpSpPr/>
             <p:nvPr/>
-          </p:nvSpPr>
-          <p:spPr>
+          </p:nvGrpSpPr>
+          <p:grpSpPr>
             <a:xfrm>
-              <a:off x="411394" y="329361"/>
-              <a:ext cx="108813" cy="108813"/>
+              <a:off x="3366544" y="3448454"/>
+              <a:ext cx="423768" cy="411423"/>
+              <a:chOff x="3372084" y="3453994"/>
+              <a:chExt cx="423768" cy="411423"/>
             </a:xfrm>
-            <a:prstGeom prst="roundRect">
-              <a:avLst>
-                <a:gd name="adj" fmla="val 11026"/>
-              </a:avLst>
-            </a:prstGeom>
-            <a:solidFill>
-              <a:srgbClr val="92D050"/>
-            </a:solidFill>
-            <a:ln>
-              <a:noFill/>
-            </a:ln>
-          </p:spPr>
-          <p:style>
-            <a:lnRef idx="2">
-              <a:schemeClr val="accent1">
-                <a:shade val="50000"/>
-              </a:schemeClr>
-            </a:lnRef>
-            <a:fillRef idx="1">
-              <a:schemeClr val="accent1"/>
-            </a:fillRef>
-            <a:effectRef idx="0">
-              <a:schemeClr val="accent1"/>
-            </a:effectRef>
-            <a:fontRef idx="minor">
-              <a:schemeClr val="lt1"/>
-            </a:fontRef>
-          </p:style>
-          <p:txBody>
-            <a:bodyPr rtlCol="0" anchor="ctr"/>
-            <a:lstStyle/>
-            <a:p>
-              <a:pPr algn="ctr"/>
-              <a:endParaRPr lang="en-US"/>
-            </a:p>
-          </p:txBody>
-        </p:sp>
-        <p:sp>
-          <p:nvSpPr>
-            <p:cNvPr id="1359" name="Rectangle: Rounded Corners 1358">
+          </p:grpSpPr>
+          <p:sp>
+            <p:nvSpPr>
+              <p:cNvPr id="17" name="Rectangle: Rounded Corners 16">
+                <a:extLst>
+                  <a:ext uri="{FF2B5EF4-FFF2-40B4-BE49-F238E27FC236}">
+                    <a16:creationId xmlns:a16="http://schemas.microsoft.com/office/drawing/2014/main" id="{E909B689-6ED3-447C-91F1-7381D3AB943A}"/>
+                  </a:ext>
+                </a:extLst>
+              </p:cNvPr>
+              <p:cNvSpPr>
+                <a:spLocks noChangeAspect="1"/>
+              </p:cNvSpPr>
+              <p:nvPr/>
+            </p:nvSpPr>
+            <p:spPr>
+              <a:xfrm>
+                <a:off x="3378258" y="3453994"/>
+                <a:ext cx="411423" cy="411423"/>
+              </a:xfrm>
+              <a:prstGeom prst="roundRect">
+                <a:avLst>
+                  <a:gd name="adj" fmla="val 11026"/>
+                </a:avLst>
+              </a:prstGeom>
+              <a:solidFill>
+                <a:schemeClr val="accent4"/>
+              </a:solidFill>
+              <a:ln>
+                <a:noFill/>
+              </a:ln>
+            </p:spPr>
+            <p:style>
+              <a:lnRef idx="2">
+                <a:schemeClr val="accent1">
+                  <a:shade val="50000"/>
+                </a:schemeClr>
+              </a:lnRef>
+              <a:fillRef idx="1">
+                <a:schemeClr val="accent1"/>
+              </a:fillRef>
+              <a:effectRef idx="0">
+                <a:schemeClr val="accent1"/>
+              </a:effectRef>
+              <a:fontRef idx="minor">
+                <a:schemeClr val="lt1"/>
+              </a:fontRef>
+            </p:style>
+            <p:txBody>
+              <a:bodyPr rtlCol="0" anchor="ctr"/>
+              <a:lstStyle/>
+              <a:p>
+                <a:pPr algn="ctr"/>
+                <a:endParaRPr lang="en-US"/>
+              </a:p>
+            </p:txBody>
+          </p:sp>
+          <p:pic>
+            <p:nvPicPr>
+              <p:cNvPr id="19" name="Picture 18" descr="A picture containing looking, dark&#10;&#10;Description automatically generated">
+                <a:extLst>
+                  <a:ext uri="{FF2B5EF4-FFF2-40B4-BE49-F238E27FC236}">
+                    <a16:creationId xmlns:a16="http://schemas.microsoft.com/office/drawing/2014/main" id="{474EC151-7DB0-4F3D-A04D-983C6E0BAD41}"/>
+                  </a:ext>
+                </a:extLst>
+              </p:cNvPr>
+              <p:cNvPicPr>
+                <a:picLocks noChangeAspect="1"/>
+              </p:cNvPicPr>
+              <p:nvPr/>
+            </p:nvPicPr>
+            <p:blipFill>
+              <a:blip r:embed="rId4">
+                <a:extLst>
+                  <a:ext uri="{28A0092B-C50C-407E-A947-70E740481C1C}">
+                    <a14:useLocalDpi xmlns:a14="http://schemas.microsoft.com/office/drawing/2010/main" val="0"/>
+                  </a:ext>
+                </a:extLst>
+              </a:blip>
+              <a:stretch>
+                <a:fillRect/>
+              </a:stretch>
+            </p:blipFill>
+            <p:spPr>
+              <a:xfrm rot="19063852">
+                <a:off x="3372084" y="3540337"/>
+                <a:ext cx="423768" cy="218694"/>
+              </a:xfrm>
+              <a:prstGeom prst="rect">
+                <a:avLst/>
+              </a:prstGeom>
+            </p:spPr>
+          </p:pic>
+        </p:grpSp>
+        <p:grpSp>
+          <p:nvGrpSpPr>
+            <p:cNvPr id="2" name="Group 1">
               <a:extLst>
                 <a:ext uri="{FF2B5EF4-FFF2-40B4-BE49-F238E27FC236}">
-                  <a16:creationId xmlns:a16="http://schemas.microsoft.com/office/drawing/2014/main" id="{014A468A-046C-3DAF-A268-FF27C58C7103}"/>
+                  <a16:creationId xmlns:a16="http://schemas.microsoft.com/office/drawing/2014/main" id="{90F1609D-91F1-4A63-BAB0-1686CA84C5DC}"/>
                 </a:ext>
               </a:extLst>
             </p:cNvPr>
-            <p:cNvSpPr>
-              <a:spLocks noChangeAspect="1"/>
-            </p:cNvSpPr>
+            <p:cNvGrpSpPr/>
             <p:nvPr/>
-          </p:nvSpPr>
-          <p:spPr>
-            <a:xfrm>
-              <a:off x="290989" y="448930"/>
-              <a:ext cx="108813" cy="108813"/>
+          </p:nvGrpSpPr>
+          <p:grpSpPr>
+            <a:xfrm rot="1720764">
+              <a:off x="3464142" y="2949121"/>
+              <a:ext cx="411423" cy="411423"/>
+              <a:chOff x="3378258" y="3001902"/>
+              <a:chExt cx="411423" cy="411423"/>
             </a:xfrm>
-            <a:prstGeom prst="roundRect">
-              <a:avLst>
-                <a:gd name="adj" fmla="val 11026"/>
-              </a:avLst>
-            </a:prstGeom>
-            <a:solidFill>
-              <a:srgbClr val="00B0F0"/>
-            </a:solidFill>
-            <a:ln>
-              <a:noFill/>
-            </a:ln>
-          </p:spPr>
-          <p:style>
-            <a:lnRef idx="2">
-              <a:schemeClr val="accent1">
-                <a:shade val="50000"/>
-              </a:schemeClr>
-            </a:lnRef>
-            <a:fillRef idx="1">
-              <a:schemeClr val="accent1"/>
-            </a:fillRef>
-            <a:effectRef idx="0">
-              <a:schemeClr val="accent1"/>
-            </a:effectRef>
-            <a:fontRef idx="minor">
-              <a:schemeClr val="lt1"/>
-            </a:fontRef>
-          </p:style>
-          <p:txBody>
-            <a:bodyPr rtlCol="0" anchor="ctr"/>
-            <a:lstStyle/>
-            <a:p>
-              <a:pPr algn="ctr"/>
-              <a:endParaRPr lang="en-US"/>
-            </a:p>
-          </p:txBody>
-        </p:sp>
-        <p:sp>
-          <p:nvSpPr>
-            <p:cNvPr id="1360" name="Rectangle: Rounded Corners 1359">
-              <a:extLst>
-                <a:ext uri="{FF2B5EF4-FFF2-40B4-BE49-F238E27FC236}">
-                  <a16:creationId xmlns:a16="http://schemas.microsoft.com/office/drawing/2014/main" id="{61F2029D-ED68-0B0E-0CEE-4E6744B13B4B}"/>
-                </a:ext>
-              </a:extLst>
-            </p:cNvPr>
-            <p:cNvSpPr>
-              <a:spLocks noChangeAspect="1"/>
-            </p:cNvSpPr>
-            <p:nvPr/>
-          </p:nvSpPr>
-          <p:spPr>
-            <a:xfrm>
-              <a:off x="411394" y="448930"/>
-              <a:ext cx="108813" cy="108813"/>
-            </a:xfrm>
-            <a:prstGeom prst="roundRect">
-              <a:avLst>
-                <a:gd name="adj" fmla="val 11026"/>
-              </a:avLst>
-            </a:prstGeom>
-            <a:solidFill>
-              <a:schemeClr val="accent4"/>
-            </a:solidFill>
-            <a:ln>
-              <a:noFill/>
-            </a:ln>
-          </p:spPr>
-          <p:style>
-            <a:lnRef idx="2">
-              <a:schemeClr val="accent1">
-                <a:shade val="50000"/>
-              </a:schemeClr>
-            </a:lnRef>
-            <a:fillRef idx="1">
-              <a:schemeClr val="accent1"/>
-            </a:fillRef>
-            <a:effectRef idx="0">
-              <a:schemeClr val="accent1"/>
-            </a:effectRef>
-            <a:fontRef idx="minor">
-              <a:schemeClr val="lt1"/>
-            </a:fontRef>
-          </p:style>
-          <p:txBody>
-            <a:bodyPr rtlCol="0" anchor="ctr"/>
-            <a:lstStyle/>
-            <a:p>
-              <a:pPr algn="ctr"/>
-              <a:endParaRPr lang="en-US"/>
-            </a:p>
-          </p:txBody>
-        </p:sp>
-        <p:pic>
-          <p:nvPicPr>
-            <p:cNvPr id="1364" name="Picture 1363" descr="A black rectangle with a black background&#10;&#10;Description automatically generated with low confidence">
-              <a:extLst>
-                <a:ext uri="{FF2B5EF4-FFF2-40B4-BE49-F238E27FC236}">
-                  <a16:creationId xmlns:a16="http://schemas.microsoft.com/office/drawing/2014/main" id="{4DB6CBC5-1150-B654-BC37-7BC9CF301A56}"/>
-                </a:ext>
-              </a:extLst>
-            </p:cNvPr>
-            <p:cNvPicPr>
-              <a:picLocks noChangeAspect="1"/>
-            </p:cNvPicPr>
-            <p:nvPr/>
-          </p:nvPicPr>
-          <p:blipFill>
-            <a:blip r:embed="rId4">
-              <a:extLst>
-                <a:ext uri="{28A0092B-C50C-407E-A947-70E740481C1C}">
-                  <a14:useLocalDpi xmlns:a14="http://schemas.microsoft.com/office/drawing/2010/main" val="0"/>
-                </a:ext>
-              </a:extLst>
-            </a:blip>
-            <a:stretch>
-              <a:fillRect/>
-            </a:stretch>
-          </p:blipFill>
-          <p:spPr>
-            <a:xfrm>
-              <a:off x="296000" y="452378"/>
-              <a:ext cx="99866" cy="100064"/>
-            </a:xfrm>
-            <a:prstGeom prst="rect">
-              <a:avLst/>
-            </a:prstGeom>
-          </p:spPr>
-        </p:pic>
-        <p:pic>
-          <p:nvPicPr>
-            <p:cNvPr id="1370" name="Picture 1369" descr="A picture containing looking, dark&#10;&#10;Description automatically generated">
-              <a:extLst>
-                <a:ext uri="{FF2B5EF4-FFF2-40B4-BE49-F238E27FC236}">
-                  <a16:creationId xmlns:a16="http://schemas.microsoft.com/office/drawing/2014/main" id="{830DC800-3FCA-0DC5-478B-52DF8926C411}"/>
-                </a:ext>
-              </a:extLst>
-            </p:cNvPr>
-            <p:cNvPicPr>
-              <a:picLocks noChangeAspect="1"/>
-            </p:cNvPicPr>
-            <p:nvPr/>
-          </p:nvPicPr>
-          <p:blipFill>
-            <a:blip r:embed="rId5">
-              <a:extLst>
-                <a:ext uri="{28A0092B-C50C-407E-A947-70E740481C1C}">
-                  <a14:useLocalDpi xmlns:a14="http://schemas.microsoft.com/office/drawing/2010/main" val="0"/>
-                </a:ext>
-              </a:extLst>
-            </a:blip>
-            <a:stretch>
-              <a:fillRect/>
-            </a:stretch>
-          </p:blipFill>
-          <p:spPr>
-            <a:xfrm rot="19063852">
-              <a:off x="409761" y="471766"/>
-              <a:ext cx="112078" cy="57840"/>
-            </a:xfrm>
-            <a:prstGeom prst="rect">
-              <a:avLst/>
-            </a:prstGeom>
-          </p:spPr>
-        </p:pic>
-        <p:pic>
-          <p:nvPicPr>
-            <p:cNvPr id="1372" name="Picture 1371" descr="Shape&#10;&#10;Description automatically generated with medium confidence">
-              <a:extLst>
-                <a:ext uri="{FF2B5EF4-FFF2-40B4-BE49-F238E27FC236}">
-                  <a16:creationId xmlns:a16="http://schemas.microsoft.com/office/drawing/2014/main" id="{BA38E7AF-D5BC-51C6-2DDB-348B4788FFFF}"/>
-                </a:ext>
-              </a:extLst>
-            </p:cNvPr>
-            <p:cNvPicPr>
-              <a:picLocks noChangeAspect="1"/>
-            </p:cNvPicPr>
-            <p:nvPr/>
-          </p:nvPicPr>
-          <p:blipFill>
-            <a:blip r:embed="rId6">
-              <a:extLst>
-                <a:ext uri="{28A0092B-C50C-407E-A947-70E740481C1C}">
-                  <a14:useLocalDpi xmlns:a14="http://schemas.microsoft.com/office/drawing/2010/main" val="0"/>
-                </a:ext>
-              </a:extLst>
-            </a:blip>
-            <a:stretch>
-              <a:fillRect/>
-            </a:stretch>
-          </p:blipFill>
-          <p:spPr>
-            <a:xfrm>
-              <a:off x="415867" y="343415"/>
-              <a:ext cx="99866" cy="79925"/>
-            </a:xfrm>
-            <a:prstGeom prst="rect">
-              <a:avLst/>
-            </a:prstGeom>
-          </p:spPr>
-        </p:pic>
+          </p:grpSpPr>
+          <p:sp>
+            <p:nvSpPr>
+              <p:cNvPr id="15" name="Rectangle: Rounded Corners 14">
+                <a:extLst>
+                  <a:ext uri="{FF2B5EF4-FFF2-40B4-BE49-F238E27FC236}">
+                    <a16:creationId xmlns:a16="http://schemas.microsoft.com/office/drawing/2014/main" id="{A722CCC7-06D4-4D15-BD84-489F52D09D4B}"/>
+                  </a:ext>
+                </a:extLst>
+              </p:cNvPr>
+              <p:cNvSpPr>
+                <a:spLocks noChangeAspect="1"/>
+              </p:cNvSpPr>
+              <p:nvPr/>
+            </p:nvSpPr>
+            <p:spPr>
+              <a:xfrm>
+                <a:off x="3378258" y="3001902"/>
+                <a:ext cx="411423" cy="411423"/>
+              </a:xfrm>
+              <a:prstGeom prst="roundRect">
+                <a:avLst>
+                  <a:gd name="adj" fmla="val 11026"/>
+                </a:avLst>
+              </a:prstGeom>
+              <a:solidFill>
+                <a:srgbClr val="92D050"/>
+              </a:solidFill>
+              <a:ln>
+                <a:noFill/>
+              </a:ln>
+            </p:spPr>
+            <p:style>
+              <a:lnRef idx="2">
+                <a:schemeClr val="accent1">
+                  <a:shade val="50000"/>
+                </a:schemeClr>
+              </a:lnRef>
+              <a:fillRef idx="1">
+                <a:schemeClr val="accent1"/>
+              </a:fillRef>
+              <a:effectRef idx="0">
+                <a:schemeClr val="accent1"/>
+              </a:effectRef>
+              <a:fontRef idx="minor">
+                <a:schemeClr val="lt1"/>
+              </a:fontRef>
+            </p:style>
+            <p:txBody>
+              <a:bodyPr rtlCol="0" anchor="ctr"/>
+              <a:lstStyle/>
+              <a:p>
+                <a:pPr algn="ctr"/>
+                <a:endParaRPr lang="en-US"/>
+              </a:p>
+            </p:txBody>
+          </p:sp>
+          <p:pic>
+            <p:nvPicPr>
+              <p:cNvPr id="20" name="Picture 19" descr="Shape&#10;&#10;Description automatically generated with medium confidence">
+                <a:extLst>
+                  <a:ext uri="{FF2B5EF4-FFF2-40B4-BE49-F238E27FC236}">
+                    <a16:creationId xmlns:a16="http://schemas.microsoft.com/office/drawing/2014/main" id="{41C60A9F-DF33-434E-81C1-9A0AB08779F6}"/>
+                  </a:ext>
+                </a:extLst>
+              </p:cNvPr>
+              <p:cNvPicPr>
+                <a:picLocks noChangeAspect="1"/>
+              </p:cNvPicPr>
+              <p:nvPr/>
+            </p:nvPicPr>
+            <p:blipFill>
+              <a:blip r:embed="rId5">
+                <a:extLst>
+                  <a:ext uri="{28A0092B-C50C-407E-A947-70E740481C1C}">
+                    <a14:useLocalDpi xmlns:a14="http://schemas.microsoft.com/office/drawing/2010/main" val="0"/>
+                  </a:ext>
+                </a:extLst>
+              </a:blip>
+              <a:stretch>
+                <a:fillRect/>
+              </a:stretch>
+            </p:blipFill>
+            <p:spPr>
+              <a:xfrm>
+                <a:off x="3395170" y="3055040"/>
+                <a:ext cx="377595" cy="302197"/>
+              </a:xfrm>
+              <a:prstGeom prst="rect">
+                <a:avLst/>
+              </a:prstGeom>
+            </p:spPr>
+          </p:pic>
+        </p:grpSp>
       </p:grpSp>
     </p:spTree>
     <p:extLst>

</xml_diff>